<commit_message>
Update documents/Report and Images
</commit_message>
<xml_diff>
--- a/docs/Final_Presentation_MultivariateTimeSeriesPredictionforStockMarketData.pptx
+++ b/docs/Final_Presentation_MultivariateTimeSeriesPredictionforStockMarketData.pptx
@@ -13353,8 +13353,8 @@
         </p:blipFill>
         <p:spPr>
           <a:xfrm>
-            <a:off x="934407" y="2090516"/>
-            <a:ext cx="3606107" cy="2200900"/>
+            <a:off x="812061" y="2090515"/>
+            <a:ext cx="3728453" cy="2275571"/>
           </a:xfrm>
           <a:prstGeom prst="rect">
             <a:avLst/>
@@ -16514,121 +16514,7 @@
               <a:buChar char="•"/>
             </a:pPr>
             <a:r>
-              <a:rPr lang="zh-TW" altLang="en-US" sz="2400" dirty="0">
-                <a:solidFill>
-                  <a:schemeClr val="dk1"/>
-                </a:solidFill>
-                <a:latin typeface="Book Antiqua" panose="02040602050305030304" pitchFamily="18" charset="0"/>
-                <a:ea typeface="微軟正黑體" panose="020B0604030504040204" pitchFamily="34" charset="-120"/>
-                <a:sym typeface="Didact Gothic"/>
-              </a:rPr>
-              <a:t>如何利用</a:t>
-            </a:r>
-            <a:r>
-              <a:rPr lang="en-US" altLang="zh-TW" sz="2400" dirty="0">
-                <a:solidFill>
-                  <a:schemeClr val="dk1"/>
-                </a:solidFill>
-                <a:latin typeface="Book Antiqua" panose="02040602050305030304" pitchFamily="18" charset="0"/>
-                <a:ea typeface="微軟正黑體" panose="020B0604030504040204" pitchFamily="34" charset="-120"/>
-                <a:sym typeface="Didact Gothic"/>
-              </a:rPr>
-              <a:t>LSTM model</a:t>
-            </a:r>
-            <a:r>
-              <a:rPr lang="zh-TW" altLang="en-US" sz="2400" dirty="0">
-                <a:solidFill>
-                  <a:schemeClr val="dk1"/>
-                </a:solidFill>
-                <a:latin typeface="Book Antiqua" panose="02040602050305030304" pitchFamily="18" charset="0"/>
-                <a:ea typeface="微軟正黑體" panose="020B0604030504040204" pitchFamily="34" charset="-120"/>
-                <a:sym typeface="Didact Gothic"/>
-              </a:rPr>
-              <a:t>來產生</a:t>
-            </a:r>
-            <a:r>
-              <a:rPr lang="en-US" altLang="zh-TW" sz="2400" dirty="0">
-                <a:solidFill>
-                  <a:schemeClr val="dk1"/>
-                </a:solidFill>
-                <a:latin typeface="Book Antiqua" panose="02040602050305030304" pitchFamily="18" charset="0"/>
-                <a:ea typeface="微軟正黑體" panose="020B0604030504040204" pitchFamily="34" charset="-120"/>
-                <a:sym typeface="Didact Gothic"/>
-              </a:rPr>
-              <a:t>50</a:t>
-            </a:r>
-            <a:r>
-              <a:rPr lang="zh-TW" altLang="en-US" sz="2400" dirty="0">
-                <a:solidFill>
-                  <a:schemeClr val="dk1"/>
-                </a:solidFill>
-                <a:latin typeface="Book Antiqua" panose="02040602050305030304" pitchFamily="18" charset="0"/>
-                <a:ea typeface="微軟正黑體" panose="020B0604030504040204" pitchFamily="34" charset="-120"/>
-                <a:sym typeface="Didact Gothic"/>
-              </a:rPr>
-              <a:t>天的預測資料</a:t>
-            </a:r>
-            <a:r>
-              <a:rPr lang="en-US" altLang="zh-TW" sz="2400" dirty="0">
-                <a:solidFill>
-                  <a:schemeClr val="dk1"/>
-                </a:solidFill>
-                <a:latin typeface="Book Antiqua" panose="02040602050305030304" pitchFamily="18" charset="0"/>
-                <a:ea typeface="微軟正黑體" panose="020B0604030504040204" pitchFamily="34" charset="-120"/>
-                <a:sym typeface="Didact Gothic"/>
-              </a:rPr>
-              <a:t>?</a:t>
-            </a:r>
-            <a:br>
-              <a:rPr lang="en-US" altLang="zh-TW" sz="2400" dirty="0">
-                <a:solidFill>
-                  <a:schemeClr val="dk1"/>
-                </a:solidFill>
-                <a:latin typeface="Book Antiqua" panose="02040602050305030304" pitchFamily="18" charset="0"/>
-                <a:ea typeface="微軟正黑體" panose="020B0604030504040204" pitchFamily="34" charset="-120"/>
-                <a:sym typeface="Didact Gothic"/>
-              </a:rPr>
-            </a:br>
-            <a:r>
-              <a:rPr lang="en-US" altLang="zh-TW" sz="2400" dirty="0">
-                <a:solidFill>
-                  <a:schemeClr val="dk1"/>
-                </a:solidFill>
-                <a:latin typeface="Book Antiqua" panose="02040602050305030304" pitchFamily="18" charset="0"/>
-                <a:ea typeface="微軟正黑體" panose="020B0604030504040204" pitchFamily="34" charset="-120"/>
-                <a:sym typeface="Didact Gothic"/>
-              </a:rPr>
-              <a:t>LSTM model output is dense(1)</a:t>
-            </a:r>
-            <a:br>
-              <a:rPr lang="en-US" altLang="zh-TW" sz="2400" dirty="0">
-                <a:solidFill>
-                  <a:schemeClr val="dk1"/>
-                </a:solidFill>
-                <a:latin typeface="Book Antiqua" panose="02040602050305030304" pitchFamily="18" charset="0"/>
-                <a:ea typeface="微軟正黑體" panose="020B0604030504040204" pitchFamily="34" charset="-120"/>
-                <a:sym typeface="Didact Gothic"/>
-              </a:rPr>
-            </a:br>
-            <a:r>
-              <a:rPr lang="en-US" altLang="zh-TW" sz="2400" dirty="0">
-                <a:solidFill>
-                  <a:schemeClr val="dk1"/>
-                </a:solidFill>
-                <a:latin typeface="Book Antiqua" panose="02040602050305030304" pitchFamily="18" charset="0"/>
-                <a:ea typeface="微軟正黑體" panose="020B0604030504040204" pitchFamily="34" charset="-120"/>
-                <a:sym typeface="Didact Gothic"/>
-              </a:rPr>
-              <a:t>Generate 50 day prediction</a:t>
-            </a:r>
-          </a:p>
-          <a:p>
-            <a:pPr marL="457200" indent="-457200">
-              <a:buFont typeface="Arial" panose="020B0604020202020204" pitchFamily="34" charset="0"/>
-              <a:buChar char="•"/>
-            </a:pPr>
-            <a:r>
-              <a:rPr lang="en-US" altLang="zh-TW" sz="2400" dirty="0">
+              <a:rPr lang="en-US" altLang="zh-TW" sz="2400" b="1" dirty="0">
                 <a:solidFill>
                   <a:schemeClr val="dk1"/>
                 </a:solidFill>

</xml_diff>